<commit_message>
fixed some improper wiring in some levels.
</commit_message>
<xml_diff>
--- a/Color_game/build_win/levels/hard_level_mixed.pptx
+++ b/Color_game/build_win/levels/hard_level_mixed.pptx
@@ -278,7 +278,7 @@
           <a:p>
             <a:fld id="{C0763E06-A817-4BB4-8553-255499158D06}" type="datetimeFigureOut">
               <a:rPr lang="en-US" smtClean="0"/>
-              <a:t>10/8/2023</a:t>
+              <a:t>10/9/2023</a:t>
             </a:fld>
             <a:endParaRPr lang="en-US"/>
           </a:p>
@@ -448,7 +448,7 @@
           <a:p>
             <a:fld id="{C0763E06-A817-4BB4-8553-255499158D06}" type="datetimeFigureOut">
               <a:rPr lang="en-US" smtClean="0"/>
-              <a:t>10/8/2023</a:t>
+              <a:t>10/9/2023</a:t>
             </a:fld>
             <a:endParaRPr lang="en-US"/>
           </a:p>
@@ -628,7 +628,7 @@
           <a:p>
             <a:fld id="{C0763E06-A817-4BB4-8553-255499158D06}" type="datetimeFigureOut">
               <a:rPr lang="en-US" smtClean="0"/>
-              <a:t>10/8/2023</a:t>
+              <a:t>10/9/2023</a:t>
             </a:fld>
             <a:endParaRPr lang="en-US"/>
           </a:p>
@@ -798,7 +798,7 @@
           <a:p>
             <a:fld id="{C0763E06-A817-4BB4-8553-255499158D06}" type="datetimeFigureOut">
               <a:rPr lang="en-US" smtClean="0"/>
-              <a:t>10/8/2023</a:t>
+              <a:t>10/9/2023</a:t>
             </a:fld>
             <a:endParaRPr lang="en-US"/>
           </a:p>
@@ -1044,7 +1044,7 @@
           <a:p>
             <a:fld id="{C0763E06-A817-4BB4-8553-255499158D06}" type="datetimeFigureOut">
               <a:rPr lang="en-US" smtClean="0"/>
-              <a:t>10/8/2023</a:t>
+              <a:t>10/9/2023</a:t>
             </a:fld>
             <a:endParaRPr lang="en-US"/>
           </a:p>
@@ -1276,7 +1276,7 @@
           <a:p>
             <a:fld id="{C0763E06-A817-4BB4-8553-255499158D06}" type="datetimeFigureOut">
               <a:rPr lang="en-US" smtClean="0"/>
-              <a:t>10/8/2023</a:t>
+              <a:t>10/9/2023</a:t>
             </a:fld>
             <a:endParaRPr lang="en-US"/>
           </a:p>
@@ -1643,7 +1643,7 @@
           <a:p>
             <a:fld id="{C0763E06-A817-4BB4-8553-255499158D06}" type="datetimeFigureOut">
               <a:rPr lang="en-US" smtClean="0"/>
-              <a:t>10/8/2023</a:t>
+              <a:t>10/9/2023</a:t>
             </a:fld>
             <a:endParaRPr lang="en-US"/>
           </a:p>
@@ -1761,7 +1761,7 @@
           <a:p>
             <a:fld id="{C0763E06-A817-4BB4-8553-255499158D06}" type="datetimeFigureOut">
               <a:rPr lang="en-US" smtClean="0"/>
-              <a:t>10/8/2023</a:t>
+              <a:t>10/9/2023</a:t>
             </a:fld>
             <a:endParaRPr lang="en-US"/>
           </a:p>
@@ -1856,7 +1856,7 @@
           <a:p>
             <a:fld id="{C0763E06-A817-4BB4-8553-255499158D06}" type="datetimeFigureOut">
               <a:rPr lang="en-US" smtClean="0"/>
-              <a:t>10/8/2023</a:t>
+              <a:t>10/9/2023</a:t>
             </a:fld>
             <a:endParaRPr lang="en-US"/>
           </a:p>
@@ -2133,7 +2133,7 @@
           <a:p>
             <a:fld id="{C0763E06-A817-4BB4-8553-255499158D06}" type="datetimeFigureOut">
               <a:rPr lang="en-US" smtClean="0"/>
-              <a:t>10/8/2023</a:t>
+              <a:t>10/9/2023</a:t>
             </a:fld>
             <a:endParaRPr lang="en-US"/>
           </a:p>
@@ -2390,7 +2390,7 @@
           <a:p>
             <a:fld id="{C0763E06-A817-4BB4-8553-255499158D06}" type="datetimeFigureOut">
               <a:rPr lang="en-US" smtClean="0"/>
-              <a:t>10/8/2023</a:t>
+              <a:t>10/9/2023</a:t>
             </a:fld>
             <a:endParaRPr lang="en-US"/>
           </a:p>
@@ -2603,7 +2603,7 @@
           <a:p>
             <a:fld id="{C0763E06-A817-4BB4-8553-255499158D06}" type="datetimeFigureOut">
               <a:rPr lang="en-US" smtClean="0"/>
-              <a:t>10/8/2023</a:t>
+              <a:t>10/9/2023</a:t>
             </a:fld>
             <a:endParaRPr lang="en-US"/>
           </a:p>

</xml_diff>